<commit_message>
Update ggplot2 part 1
</commit_message>
<xml_diff>
--- a/notes/ggplot2_part1.pptx
+++ b/notes/ggplot2_part1.pptx
@@ -328,7 +328,7 @@
           <a:lstStyle/>
           <a:p>
             <a:fld id="{A65958ED-12ED-1142-8369-DADF60CDC5D9}" type="datetimeFigureOut">
-              <a:t>9/20/16</a:t>
+              <a:t>9/19/18</a:t>
             </a:fld>
             <a:endParaRPr lang="en-US"/>
           </a:p>
@@ -494,7 +494,7 @@
           <a:lstStyle/>
           <a:p>
             <a:fld id="{A65958ED-12ED-1142-8369-DADF60CDC5D9}" type="datetimeFigureOut">
-              <a:t>9/20/16</a:t>
+              <a:t>9/19/18</a:t>
             </a:fld>
             <a:endParaRPr lang="en-US"/>
           </a:p>
@@ -670,7 +670,7 @@
           <a:lstStyle/>
           <a:p>
             <a:fld id="{A65958ED-12ED-1142-8369-DADF60CDC5D9}" type="datetimeFigureOut">
-              <a:t>9/20/16</a:t>
+              <a:t>9/19/18</a:t>
             </a:fld>
             <a:endParaRPr lang="en-US"/>
           </a:p>
@@ -836,7 +836,7 @@
           <a:lstStyle/>
           <a:p>
             <a:fld id="{A65958ED-12ED-1142-8369-DADF60CDC5D9}" type="datetimeFigureOut">
-              <a:t>9/20/16</a:t>
+              <a:t>9/19/18</a:t>
             </a:fld>
             <a:endParaRPr lang="en-US"/>
           </a:p>
@@ -1079,7 +1079,7 @@
           <a:lstStyle/>
           <a:p>
             <a:fld id="{A65958ED-12ED-1142-8369-DADF60CDC5D9}" type="datetimeFigureOut">
-              <a:t>9/20/16</a:t>
+              <a:t>9/19/18</a:t>
             </a:fld>
             <a:endParaRPr lang="en-US"/>
           </a:p>
@@ -1362,7 +1362,7 @@
           <a:lstStyle/>
           <a:p>
             <a:fld id="{A65958ED-12ED-1142-8369-DADF60CDC5D9}" type="datetimeFigureOut">
-              <a:t>9/20/16</a:t>
+              <a:t>9/19/18</a:t>
             </a:fld>
             <a:endParaRPr lang="en-US"/>
           </a:p>
@@ -1784,7 +1784,7 @@
           <a:lstStyle/>
           <a:p>
             <a:fld id="{A65958ED-12ED-1142-8369-DADF60CDC5D9}" type="datetimeFigureOut">
-              <a:t>9/20/16</a:t>
+              <a:t>9/19/18</a:t>
             </a:fld>
             <a:endParaRPr lang="en-US"/>
           </a:p>
@@ -1899,7 +1899,7 @@
           <a:lstStyle/>
           <a:p>
             <a:fld id="{A65958ED-12ED-1142-8369-DADF60CDC5D9}" type="datetimeFigureOut">
-              <a:t>9/20/16</a:t>
+              <a:t>9/19/18</a:t>
             </a:fld>
             <a:endParaRPr lang="en-US"/>
           </a:p>
@@ -1992,7 +1992,7 @@
           <a:lstStyle/>
           <a:p>
             <a:fld id="{A65958ED-12ED-1142-8369-DADF60CDC5D9}" type="datetimeFigureOut">
-              <a:t>9/20/16</a:t>
+              <a:t>9/19/18</a:t>
             </a:fld>
             <a:endParaRPr lang="en-US"/>
           </a:p>
@@ -2265,7 +2265,7 @@
           <a:lstStyle/>
           <a:p>
             <a:fld id="{A65958ED-12ED-1142-8369-DADF60CDC5D9}" type="datetimeFigureOut">
-              <a:t>9/20/16</a:t>
+              <a:t>9/19/18</a:t>
             </a:fld>
             <a:endParaRPr lang="en-US"/>
           </a:p>
@@ -2515,7 +2515,7 @@
           <a:lstStyle/>
           <a:p>
             <a:fld id="{A65958ED-12ED-1142-8369-DADF60CDC5D9}" type="datetimeFigureOut">
-              <a:t>9/20/16</a:t>
+              <a:t>9/19/18</a:t>
             </a:fld>
             <a:endParaRPr lang="en-US"/>
           </a:p>
@@ -2724,7 +2724,7 @@
           </a:lstStyle>
           <a:p>
             <a:fld id="{A65958ED-12ED-1142-8369-DADF60CDC5D9}" type="datetimeFigureOut">
-              <a:t>9/20/16</a:t>
+              <a:t>9/19/18</a:t>
             </a:fld>
             <a:endParaRPr lang="en-US"/>
           </a:p>
@@ -3219,12 +3219,8 @@
           <a:lstStyle/>
           <a:p>
             <a:r>
-              <a:rPr lang="en-US" dirty="0" smtClean="0"/>
-              <a:t>Looks </a:t>
-            </a:r>
-            <a:r>
               <a:rPr lang="en-US" dirty="0"/>
-              <a:t>for data in a data frame, similar to lattice, or in the parent environment</a:t>
+              <a:t>Looks for data in a data frame, similar to lattice, or in the parent environment</a:t>
             </a:r>
           </a:p>
           <a:p>
@@ -3246,11 +3242,7 @@
             </a:r>
             <a:r>
               <a:rPr lang="en-US" dirty="0"/>
-              <a:t> (points, lines</a:t>
-            </a:r>
-            <a:r>
-              <a:rPr lang="en-US" dirty="0" smtClean="0"/>
-              <a:t>)</a:t>
+              <a:t> (points, lines)</a:t>
             </a:r>
           </a:p>
           <a:p>
@@ -3267,13 +3259,8 @@
             </a:r>
             <a:r>
               <a:rPr lang="en-US" dirty="0"/>
-              <a:t> function in base graphics </a:t>
-            </a:r>
-            <a:r>
-              <a:rPr lang="en-US" dirty="0" smtClean="0"/>
-              <a:t>system</a:t>
-            </a:r>
-            <a:endParaRPr lang="en-US" dirty="0"/>
+              <a:t> function in base graphics system</a:t>
+            </a:r>
           </a:p>
         </p:txBody>
       </p:sp>
@@ -3287,13 +3274,6 @@
   <p:clrMapOvr>
     <a:masterClrMapping/>
   </p:clrMapOvr>
-  <p:timing>
-    <p:tnLst>
-      <p:par>
-        <p:cTn id="1" dur="indefinite" restart="never" nodeType="tmRoot"/>
-      </p:par>
-    </p:tnLst>
-  </p:timing>
 </p:sld>
 </file>
 
@@ -3368,29 +3348,17 @@
           </a:p>
           <a:p>
             <a:r>
-              <a:rPr lang="en-US" dirty="0" smtClean="0"/>
-              <a:t>Factors </a:t>
-            </a:r>
-            <a:r>
               <a:rPr lang="en-US" dirty="0"/>
-              <a:t>are important for indicating subsets of the data (if they are to have different properties</a:t>
-            </a:r>
-            <a:r>
-              <a:rPr lang="en-US" dirty="0" smtClean="0"/>
-              <a:t>) and annotating points; factors </a:t>
-            </a:r>
+              <a:t>Factors are important for indicating subsets of the data (if they are to have different properties) and annotating points; factors should be </a:t>
+            </a:r>
+            <a:r>
+              <a:rPr lang="en-US" b="1" dirty="0"/>
+              <a:t>labeled</a:t>
+            </a:r>
+          </a:p>
+          <a:p>
             <a:r>
               <a:rPr lang="en-US" dirty="0"/>
-              <a:t>should be </a:t>
-            </a:r>
-            <a:r>
-              <a:rPr lang="en-US" b="1" dirty="0" smtClean="0"/>
-              <a:t>labeled</a:t>
-            </a:r>
-          </a:p>
-          <a:p>
-            <a:r>
-              <a:rPr lang="en-US" dirty="0" smtClean="0"/>
               <a:t>The </a:t>
             </a:r>
             <a:r>
@@ -3432,13 +3400,6 @@
   <p:clrMapOvr>
     <a:masterClrMapping/>
   </p:clrMapOvr>
-  <p:timing>
-    <p:tnLst>
-      <p:par>
-        <p:cTn id="1" dur="indefinite" restart="never" nodeType="tmRoot"/>
-      </p:par>
-    </p:tnLst>
-  </p:timing>
 </p:sld>
 </file>
 
@@ -3632,138 +3593,6 @@
   <p:clrMapOvr>
     <a:masterClrMapping/>
   </p:clrMapOvr>
-  <p:timing>
-    <p:tnLst>
-      <p:par>
-        <p:cTn id="1" dur="indefinite" restart="never" nodeType="tmRoot">
-          <p:childTnLst>
-            <p:seq concurrent="1" nextAc="seek">
-              <p:cTn id="2" dur="indefinite" nodeType="mainSeq">
-                <p:childTnLst>
-                  <p:par>
-                    <p:cTn id="3" fill="hold">
-                      <p:stCondLst>
-                        <p:cond delay="indefinite"/>
-                      </p:stCondLst>
-                      <p:childTnLst>
-                        <p:par>
-                          <p:cTn id="4" fill="hold">
-                            <p:stCondLst>
-                              <p:cond delay="0"/>
-                            </p:stCondLst>
-                            <p:childTnLst>
-                              <p:par>
-                                <p:cTn id="5" presetID="1" presetClass="entr" presetSubtype="0" fill="hold" grpId="0" nodeType="clickEffect">
-                                  <p:stCondLst>
-                                    <p:cond delay="0"/>
-                                  </p:stCondLst>
-                                  <p:childTnLst>
-                                    <p:set>
-                                      <p:cBhvr>
-                                        <p:cTn id="6" dur="1" fill="hold">
-                                          <p:stCondLst>
-                                            <p:cond delay="0"/>
-                                          </p:stCondLst>
-                                        </p:cTn>
-                                        <p:tgtEl>
-                                          <p:spTgt spid="5"/>
-                                        </p:tgtEl>
-                                        <p:attrNameLst>
-                                          <p:attrName>style.visibility</p:attrName>
-                                        </p:attrNameLst>
-                                      </p:cBhvr>
-                                      <p:to>
-                                        <p:strVal val="visible"/>
-                                      </p:to>
-                                    </p:set>
-                                  </p:childTnLst>
-                                </p:cTn>
-                              </p:par>
-                              <p:par>
-                                <p:cTn id="7" presetID="1" presetClass="entr" presetSubtype="0" fill="hold" nodeType="withEffect">
-                                  <p:stCondLst>
-                                    <p:cond delay="0"/>
-                                  </p:stCondLst>
-                                  <p:childTnLst>
-                                    <p:set>
-                                      <p:cBhvr>
-                                        <p:cTn id="8" dur="1" fill="hold">
-                                          <p:stCondLst>
-                                            <p:cond delay="0"/>
-                                          </p:stCondLst>
-                                        </p:cTn>
-                                        <p:tgtEl>
-                                          <p:spTgt spid="8"/>
-                                        </p:tgtEl>
-                                        <p:attrNameLst>
-                                          <p:attrName>style.visibility</p:attrName>
-                                        </p:attrNameLst>
-                                      </p:cBhvr>
-                                      <p:to>
-                                        <p:strVal val="visible"/>
-                                      </p:to>
-                                    </p:set>
-                                  </p:childTnLst>
-                                </p:cTn>
-                              </p:par>
-                              <p:par>
-                                <p:cTn id="9" presetID="1" presetClass="entr" presetSubtype="0" fill="hold" nodeType="withEffect">
-                                  <p:stCondLst>
-                                    <p:cond delay="0"/>
-                                  </p:stCondLst>
-                                  <p:childTnLst>
-                                    <p:set>
-                                      <p:cBhvr>
-                                        <p:cTn id="10" dur="1" fill="hold">
-                                          <p:stCondLst>
-                                            <p:cond delay="0"/>
-                                          </p:stCondLst>
-                                        </p:cTn>
-                                        <p:tgtEl>
-                                          <p:spTgt spid="7"/>
-                                        </p:tgtEl>
-                                        <p:attrNameLst>
-                                          <p:attrName>style.visibility</p:attrName>
-                                        </p:attrNameLst>
-                                      </p:cBhvr>
-                                      <p:to>
-                                        <p:strVal val="visible"/>
-                                      </p:to>
-                                    </p:set>
-                                  </p:childTnLst>
-                                </p:cTn>
-                              </p:par>
-                            </p:childTnLst>
-                          </p:cTn>
-                        </p:par>
-                      </p:childTnLst>
-                    </p:cTn>
-                  </p:par>
-                </p:childTnLst>
-              </p:cTn>
-              <p:prevCondLst>
-                <p:cond evt="onPrev" delay="0">
-                  <p:tgtEl>
-                    <p:sldTgt/>
-                  </p:tgtEl>
-                </p:cond>
-              </p:prevCondLst>
-              <p:nextCondLst>
-                <p:cond evt="onNext" delay="0">
-                  <p:tgtEl>
-                    <p:sldTgt/>
-                  </p:tgtEl>
-                </p:cond>
-              </p:nextCondLst>
-            </p:seq>
-          </p:childTnLst>
-        </p:cTn>
-      </p:par>
-    </p:tnLst>
-    <p:bldLst>
-      <p:bldP spid="5" grpId="0" animBg="1"/>
-    </p:bldLst>
-  </p:timing>
 </p:sld>
 </file>
 
@@ -4103,13 +3932,6 @@
   <p:clrMapOvr>
     <a:masterClrMapping/>
   </p:clrMapOvr>
-  <p:timing>
-    <p:tnLst>
-      <p:par>
-        <p:cTn id="1" dur="indefinite" restart="never" nodeType="tmRoot"/>
-      </p:par>
-    </p:tnLst>
-  </p:timing>
 </p:sld>
 </file>
 
@@ -4373,13 +4195,6 @@
   <p:clrMapOvr>
     <a:masterClrMapping/>
   </p:clrMapOvr>
-  <p:timing>
-    <p:tnLst>
-      <p:par>
-        <p:cTn id="1" dur="indefinite" restart="never" nodeType="tmRoot"/>
-      </p:par>
-    </p:tnLst>
-  </p:timing>
 </p:sld>
 </file>
 
@@ -4491,13 +4306,6 @@
   <p:clrMapOvr>
     <a:masterClrMapping/>
   </p:clrMapOvr>
-  <p:timing>
-    <p:tnLst>
-      <p:par>
-        <p:cTn id="1" dur="indefinite" restart="never" nodeType="tmRoot"/>
-      </p:par>
-    </p:tnLst>
-  </p:timing>
 </p:sld>
 </file>
 
@@ -4609,13 +4417,6 @@
   <p:clrMapOvr>
     <a:masterClrMapping/>
   </p:clrMapOvr>
-  <p:timing>
-    <p:tnLst>
-      <p:par>
-        <p:cTn id="1" dur="indefinite" restart="never" nodeType="tmRoot"/>
-      </p:par>
-    </p:tnLst>
-  </p:timing>
 </p:sld>
 </file>
 
@@ -4806,13 +4607,6 @@
   <p:clrMapOvr>
     <a:masterClrMapping/>
   </p:clrMapOvr>
-  <p:timing>
-    <p:tnLst>
-      <p:par>
-        <p:cTn id="1" dur="indefinite" restart="never" nodeType="tmRoot"/>
-      </p:par>
-    </p:tnLst>
-  </p:timing>
 </p:sld>
 </file>
 
@@ -4913,13 +4707,6 @@
   <p:clrMapOvr>
     <a:masterClrMapping/>
   </p:clrMapOvr>
-  <p:timing>
-    <p:tnLst>
-      <p:par>
-        <p:cTn id="1" dur="indefinite" restart="never" nodeType="tmRoot"/>
-      </p:par>
-    </p:tnLst>
-  </p:timing>
 </p:sld>
 </file>
 
@@ -5000,8 +4787,8 @@
         </p:nvSpPr>
         <p:spPr>
           <a:xfrm>
-            <a:off x="3568923" y="3514771"/>
-            <a:ext cx="5117877" cy="1323439"/>
+            <a:off x="2875919" y="3514771"/>
+            <a:ext cx="5810881" cy="1569660"/>
           </a:xfrm>
           <a:prstGeom prst="rect">
             <a:avLst/>
@@ -5015,47 +4802,231 @@
           <a:lstStyle/>
           <a:p>
             <a:r>
-              <a:rPr lang="en-US" sz="1600">
+              <a:rPr lang="en-US" sz="1600" dirty="0">
                 <a:latin typeface="Courier"/>
                 <a:cs typeface="Courier"/>
               </a:rPr>
-              <a:t>eno &lt;- read.csv("eno.csv")</a:t>
-            </a:r>
-          </a:p>
-          <a:p>
-            <a:r>
-              <a:rPr lang="en-US" sz="1600">
+              <a:t>library(</a:t>
+            </a:r>
+            <a:r>
+              <a:rPr lang="en-US" sz="1600" dirty="0" err="1">
                 <a:latin typeface="Courier"/>
                 <a:cs typeface="Courier"/>
               </a:rPr>
-              <a:t>env &lt;- read.csv("environmental.csv”)</a:t>
-            </a:r>
-          </a:p>
-          <a:p>
-            <a:r>
-              <a:rPr lang="en-US" sz="1600">
+              <a:t>readr</a:t>
+            </a:r>
+            <a:r>
+              <a:rPr lang="en-US" sz="1600" dirty="0">
                 <a:latin typeface="Courier"/>
                 <a:cs typeface="Courier"/>
               </a:rPr>
-              <a:t>skin &lt;- read.csv("skin.csv")</a:t>
-            </a:r>
-          </a:p>
-          <a:p>
-            <a:r>
-              <a:rPr lang="en-US" sz="1600">
+              <a:t>)</a:t>
+            </a:r>
+          </a:p>
+          <a:p>
+            <a:r>
+              <a:rPr lang="en-US" sz="1600" dirty="0" err="1">
                 <a:latin typeface="Courier"/>
                 <a:cs typeface="Courier"/>
               </a:rPr>
-              <a:t>maacs &lt;- merge(eno, env)</a:t>
-            </a:r>
-          </a:p>
-          <a:p>
-            <a:r>
-              <a:rPr lang="en-US" sz="1600">
+              <a:t>eno</a:t>
+            </a:r>
+            <a:r>
+              <a:rPr lang="en-US" sz="1600" dirty="0">
                 <a:latin typeface="Courier"/>
                 <a:cs typeface="Courier"/>
               </a:rPr>
-              <a:t>maacs &lt;- merge(maacs, skin)</a:t>
+              <a:t> &lt;- </a:t>
+            </a:r>
+            <a:r>
+              <a:rPr lang="en-US" sz="1600" dirty="0" err="1">
+                <a:latin typeface="Courier"/>
+                <a:cs typeface="Courier"/>
+              </a:rPr>
+              <a:t>read_csv</a:t>
+            </a:r>
+            <a:r>
+              <a:rPr lang="en-US" sz="1600" dirty="0">
+                <a:latin typeface="Courier"/>
+                <a:cs typeface="Courier"/>
+              </a:rPr>
+              <a:t>("</a:t>
+            </a:r>
+            <a:r>
+              <a:rPr lang="en-US" sz="1600" dirty="0" err="1">
+                <a:latin typeface="Courier"/>
+                <a:cs typeface="Courier"/>
+              </a:rPr>
+              <a:t>eno.csv</a:t>
+            </a:r>
+            <a:r>
+              <a:rPr lang="en-US" sz="1600" dirty="0">
+                <a:latin typeface="Courier"/>
+                <a:cs typeface="Courier"/>
+              </a:rPr>
+              <a:t>")</a:t>
+            </a:r>
+          </a:p>
+          <a:p>
+            <a:r>
+              <a:rPr lang="en-US" sz="1600" dirty="0" err="1">
+                <a:latin typeface="Courier"/>
+                <a:cs typeface="Courier"/>
+              </a:rPr>
+              <a:t>env</a:t>
+            </a:r>
+            <a:r>
+              <a:rPr lang="en-US" sz="1600" dirty="0">
+                <a:latin typeface="Courier"/>
+                <a:cs typeface="Courier"/>
+              </a:rPr>
+              <a:t> &lt;- </a:t>
+            </a:r>
+            <a:r>
+              <a:rPr lang="en-US" sz="1600" dirty="0" err="1">
+                <a:latin typeface="Courier"/>
+                <a:cs typeface="Courier"/>
+              </a:rPr>
+              <a:t>read_csv</a:t>
+            </a:r>
+            <a:r>
+              <a:rPr lang="en-US" sz="1600" dirty="0">
+                <a:latin typeface="Courier"/>
+                <a:cs typeface="Courier"/>
+              </a:rPr>
+              <a:t>("</a:t>
+            </a:r>
+            <a:r>
+              <a:rPr lang="en-US" sz="1600" dirty="0" err="1">
+                <a:latin typeface="Courier"/>
+                <a:cs typeface="Courier"/>
+              </a:rPr>
+              <a:t>environmental.csv</a:t>
+            </a:r>
+            <a:r>
+              <a:rPr lang="en-US" sz="1600" dirty="0">
+                <a:latin typeface="Courier"/>
+                <a:cs typeface="Courier"/>
+              </a:rPr>
+              <a:t>”)</a:t>
+            </a:r>
+          </a:p>
+          <a:p>
+            <a:r>
+              <a:rPr lang="en-US" sz="1600" dirty="0">
+                <a:latin typeface="Courier"/>
+                <a:cs typeface="Courier"/>
+              </a:rPr>
+              <a:t>skin &lt;- </a:t>
+            </a:r>
+            <a:r>
+              <a:rPr lang="en-US" sz="1600" dirty="0" err="1">
+                <a:latin typeface="Courier"/>
+                <a:cs typeface="Courier"/>
+              </a:rPr>
+              <a:t>read_csv</a:t>
+            </a:r>
+            <a:r>
+              <a:rPr lang="en-US" sz="1600" dirty="0">
+                <a:latin typeface="Courier"/>
+                <a:cs typeface="Courier"/>
+              </a:rPr>
+              <a:t>("</a:t>
+            </a:r>
+            <a:r>
+              <a:rPr lang="en-US" sz="1600" dirty="0" err="1">
+                <a:latin typeface="Courier"/>
+                <a:cs typeface="Courier"/>
+              </a:rPr>
+              <a:t>skin.csv</a:t>
+            </a:r>
+            <a:r>
+              <a:rPr lang="en-US" sz="1600" dirty="0">
+                <a:latin typeface="Courier"/>
+                <a:cs typeface="Courier"/>
+              </a:rPr>
+              <a:t>")</a:t>
+            </a:r>
+          </a:p>
+          <a:p>
+            <a:r>
+              <a:rPr lang="en-US" sz="1600" dirty="0" err="1">
+                <a:latin typeface="Courier"/>
+                <a:cs typeface="Courier"/>
+              </a:rPr>
+              <a:t>maacs</a:t>
+            </a:r>
+            <a:r>
+              <a:rPr lang="en-US" sz="1600" dirty="0">
+                <a:latin typeface="Courier"/>
+                <a:cs typeface="Courier"/>
+              </a:rPr>
+              <a:t> &lt;- </a:t>
+            </a:r>
+            <a:r>
+              <a:rPr lang="en-US" sz="1600" dirty="0" err="1">
+                <a:latin typeface="Courier"/>
+                <a:cs typeface="Courier"/>
+              </a:rPr>
+              <a:t>left_join</a:t>
+            </a:r>
+            <a:r>
+              <a:rPr lang="en-US" sz="1600" dirty="0">
+                <a:latin typeface="Courier"/>
+                <a:cs typeface="Courier"/>
+              </a:rPr>
+              <a:t>(</a:t>
+            </a:r>
+            <a:r>
+              <a:rPr lang="en-US" sz="1600" dirty="0" err="1">
+                <a:latin typeface="Courier"/>
+                <a:cs typeface="Courier"/>
+              </a:rPr>
+              <a:t>eno</a:t>
+            </a:r>
+            <a:r>
+              <a:rPr lang="en-US" sz="1600" dirty="0">
+                <a:latin typeface="Courier"/>
+                <a:cs typeface="Courier"/>
+              </a:rPr>
+              <a:t>, </a:t>
+            </a:r>
+            <a:r>
+              <a:rPr lang="en-US" sz="1600" dirty="0" err="1">
+                <a:latin typeface="Courier"/>
+                <a:cs typeface="Courier"/>
+              </a:rPr>
+              <a:t>env</a:t>
+            </a:r>
+            <a:r>
+              <a:rPr lang="en-US" sz="1600" dirty="0">
+                <a:latin typeface="Courier"/>
+                <a:cs typeface="Courier"/>
+              </a:rPr>
+              <a:t>, by = “id”) %&gt;%</a:t>
+            </a:r>
+          </a:p>
+          <a:p>
+            <a:r>
+              <a:rPr lang="en-US" sz="1600" dirty="0">
+                <a:latin typeface="Courier"/>
+                <a:cs typeface="Courier"/>
+              </a:rPr>
+              <a:t>			 </a:t>
+            </a:r>
+            <a:r>
+              <a:rPr lang="en-US" sz="1600" dirty="0" err="1">
+                <a:latin typeface="Courier"/>
+                <a:cs typeface="Courier"/>
+              </a:rPr>
+              <a:t>left_join</a:t>
+            </a:r>
+            <a:r>
+              <a:rPr lang="en-US" sz="1600" dirty="0">
+                <a:latin typeface="Courier"/>
+                <a:cs typeface="Courier"/>
+              </a:rPr>
+              <a:t>(skin, by = “id”)</a:t>
             </a:r>
           </a:p>
         </p:txBody>
@@ -5068,7 +5039,7 @@
         </p:nvSpPr>
         <p:spPr>
           <a:xfrm>
-            <a:off x="318007" y="4007496"/>
+            <a:off x="164740" y="4017121"/>
             <a:ext cx="2557912" cy="369332"/>
           </a:xfrm>
           <a:prstGeom prst="rect">
@@ -5083,15 +5054,19 @@
           <a:lstStyle/>
           <a:p>
             <a:r>
-              <a:rPr lang="en-US"/>
+              <a:rPr lang="en-US" dirty="0"/>
               <a:t>Unzip the </a:t>
             </a:r>
             <a:r>
-              <a:rPr lang="en-US" b="1"/>
-              <a:t>plotting.zip </a:t>
-            </a:r>
-            <a:r>
-              <a:rPr lang="en-US"/>
+              <a:rPr lang="en-US" b="1" dirty="0" err="1"/>
+              <a:t>plotting.zip</a:t>
+            </a:r>
+            <a:r>
+              <a:rPr lang="en-US" b="1" dirty="0"/>
+              <a:t> </a:t>
+            </a:r>
+            <a:r>
+              <a:rPr lang="en-US" dirty="0"/>
               <a:t>file</a:t>
             </a:r>
           </a:p>
@@ -5107,13 +5082,6 @@
   <p:clrMapOvr>
     <a:masterClrMapping/>
   </p:clrMapOvr>
-  <p:timing>
-    <p:tnLst>
-      <p:par>
-        <p:cTn id="1" dur="indefinite" restart="never" nodeType="tmRoot"/>
-      </p:par>
-    </p:tnLst>
-  </p:timing>
 </p:sld>
 </file>
 
@@ -5371,13 +5339,6 @@
   <p:clrMapOvr>
     <a:masterClrMapping/>
   </p:clrMapOvr>
-  <p:timing>
-    <p:tnLst>
-      <p:par>
-        <p:cTn id="1" dur="indefinite" restart="never" nodeType="tmRoot"/>
-      </p:par>
-    </p:tnLst>
-  </p:timing>
 </p:sld>
 </file>
 
@@ -5489,13 +5450,6 @@
   <p:clrMapOvr>
     <a:masterClrMapping/>
   </p:clrMapOvr>
-  <p:timing>
-    <p:tnLst>
-      <p:par>
-        <p:cTn id="1" dur="indefinite" restart="never" nodeType="tmRoot"/>
-      </p:par>
-    </p:tnLst>
-  </p:timing>
 </p:sld>
 </file>
 
@@ -5666,13 +5620,6 @@
   <p:clrMapOvr>
     <a:masterClrMapping/>
   </p:clrMapOvr>
-  <p:timing>
-    <p:tnLst>
-      <p:par>
-        <p:cTn id="1" dur="indefinite" restart="never" nodeType="tmRoot"/>
-      </p:par>
-    </p:tnLst>
-  </p:timing>
 </p:sld>
 </file>
 
@@ -5921,13 +5868,6 @@
   <p:clrMapOvr>
     <a:masterClrMapping/>
   </p:clrMapOvr>
-  <p:timing>
-    <p:tnLst>
-      <p:par>
-        <p:cTn id="1" dur="indefinite" restart="never" nodeType="tmRoot"/>
-      </p:par>
-    </p:tnLst>
-  </p:timing>
 </p:sld>
 </file>
 
@@ -6054,28 +5994,20 @@
               <a:t>, color = </a:t>
             </a:r>
             <a:r>
-              <a:rPr lang="en-US" sz="1600" dirty="0" err="1" smtClean="0"/>
+              <a:rPr lang="en-US" sz="1600" dirty="0" err="1"/>
               <a:t>mopos</a:t>
             </a:r>
             <a:r>
-              <a:rPr lang="en-US" sz="1600" dirty="0" smtClean="0"/>
+              <a:rPr lang="en-US" sz="1600" dirty="0"/>
               <a:t>) + </a:t>
             </a:r>
             <a:r>
-              <a:rPr lang="en-US" sz="1600" dirty="0" err="1" smtClean="0"/>
+              <a:rPr lang="en-US" sz="1600" dirty="0" err="1"/>
               <a:t>geom_smooth</a:t>
             </a:r>
             <a:r>
-              <a:rPr lang="en-US" sz="1600" dirty="0" smtClean="0"/>
-              <a:t>(</a:t>
-            </a:r>
-            <a:r>
-              <a:rPr lang="en-US" sz="1600" dirty="0" smtClean="0"/>
-              <a:t>method = </a:t>
-            </a:r>
-            <a:r>
               <a:rPr lang="en-US" sz="1600" dirty="0"/>
-              <a:t>"lm")</a:t>
+              <a:t>(method = "lm")</a:t>
             </a:r>
           </a:p>
         </p:txBody>
@@ -6210,130 +6142,6 @@
   <p:clrMapOvr>
     <a:masterClrMapping/>
   </p:clrMapOvr>
-  <p:timing>
-    <p:tnLst>
-      <p:par>
-        <p:cTn id="1" dur="indefinite" restart="never" nodeType="tmRoot">
-          <p:childTnLst>
-            <p:seq concurrent="1" nextAc="seek">
-              <p:cTn id="2" dur="indefinite" nodeType="mainSeq">
-                <p:childTnLst>
-                  <p:par>
-                    <p:cTn id="3" fill="hold">
-                      <p:stCondLst>
-                        <p:cond delay="indefinite"/>
-                      </p:stCondLst>
-                      <p:childTnLst>
-                        <p:par>
-                          <p:cTn id="4" fill="hold">
-                            <p:stCondLst>
-                              <p:cond delay="0"/>
-                            </p:stCondLst>
-                            <p:childTnLst>
-                              <p:par>
-                                <p:cTn id="5" presetID="1" presetClass="entr" presetSubtype="0" fill="hold" grpId="0" nodeType="clickEffect">
-                                  <p:stCondLst>
-                                    <p:cond delay="0"/>
-                                  </p:stCondLst>
-                                  <p:childTnLst>
-                                    <p:set>
-                                      <p:cBhvr>
-                                        <p:cTn id="6" dur="1" fill="hold">
-                                          <p:stCondLst>
-                                            <p:cond delay="0"/>
-                                          </p:stCondLst>
-                                        </p:cTn>
-                                        <p:tgtEl>
-                                          <p:spTgt spid="5"/>
-                                        </p:tgtEl>
-                                        <p:attrNameLst>
-                                          <p:attrName>style.visibility</p:attrName>
-                                        </p:attrNameLst>
-                                      </p:cBhvr>
-                                      <p:to>
-                                        <p:strVal val="visible"/>
-                                      </p:to>
-                                    </p:set>
-                                  </p:childTnLst>
-                                </p:cTn>
-                              </p:par>
-                            </p:childTnLst>
-                          </p:cTn>
-                        </p:par>
-                      </p:childTnLst>
-                    </p:cTn>
-                  </p:par>
-                  <p:par>
-                    <p:cTn id="7" fill="hold">
-                      <p:stCondLst>
-                        <p:cond delay="indefinite"/>
-                      </p:stCondLst>
-                      <p:childTnLst>
-                        <p:par>
-                          <p:cTn id="8" fill="hold">
-                            <p:stCondLst>
-                              <p:cond delay="0"/>
-                            </p:stCondLst>
-                            <p:childTnLst>
-                              <p:par>
-                                <p:cTn id="9" presetID="1" presetClass="entr" presetSubtype="0" fill="hold" grpId="0" nodeType="clickEffect">
-                                  <p:stCondLst>
-                                    <p:cond delay="0"/>
-                                  </p:stCondLst>
-                                  <p:childTnLst>
-                                    <p:set>
-                                      <p:cBhvr>
-                                        <p:cTn id="10" dur="1" fill="hold">
-                                          <p:stCondLst>
-                                            <p:cond delay="0"/>
-                                          </p:stCondLst>
-                                        </p:cTn>
-                                        <p:tgtEl>
-                                          <p:spTgt spid="7"/>
-                                        </p:tgtEl>
-                                        <p:attrNameLst>
-                                          <p:attrName>style.visibility</p:attrName>
-                                        </p:attrNameLst>
-                                      </p:cBhvr>
-                                      <p:to>
-                                        <p:strVal val="visible"/>
-                                      </p:to>
-                                    </p:set>
-                                  </p:childTnLst>
-                                </p:cTn>
-                              </p:par>
-                            </p:childTnLst>
-                          </p:cTn>
-                        </p:par>
-                      </p:childTnLst>
-                    </p:cTn>
-                  </p:par>
-                </p:childTnLst>
-              </p:cTn>
-              <p:prevCondLst>
-                <p:cond evt="onPrev" delay="0">
-                  <p:tgtEl>
-                    <p:sldTgt/>
-                  </p:tgtEl>
-                </p:cond>
-              </p:prevCondLst>
-              <p:nextCondLst>
-                <p:cond evt="onNext" delay="0">
-                  <p:tgtEl>
-                    <p:sldTgt/>
-                  </p:tgtEl>
-                </p:cond>
-              </p:nextCondLst>
-            </p:seq>
-          </p:childTnLst>
-        </p:cTn>
-      </p:par>
-    </p:tnLst>
-    <p:bldLst>
-      <p:bldP spid="5" grpId="0" animBg="1"/>
-      <p:bldP spid="7" grpId="0" animBg="1"/>
-    </p:bldLst>
-  </p:timing>
 </p:sld>
 </file>
 
@@ -6450,34 +6258,29 @@
               <a:t>), data = </a:t>
             </a:r>
             <a:r>
-              <a:rPr lang="en-US" sz="1600" dirty="0" err="1" smtClean="0"/>
+              <a:rPr lang="en-US" sz="1600" dirty="0" err="1"/>
               <a:t>maacs</a:t>
             </a:r>
             <a:r>
-              <a:rPr lang="en-US" sz="1600" dirty="0" smtClean="0"/>
-              <a:t>, </a:t>
-            </a:r>
-            <a:r>
               <a:rPr lang="en-US" sz="1600" dirty="0"/>
-              <a:t>facets = . ~ </a:t>
+              <a:t>, facets = . ~ </a:t>
             </a:r>
             <a:r>
               <a:rPr lang="en-US" sz="1600" dirty="0" err="1"/>
               <a:t>mopos</a:t>
             </a:r>
             <a:r>
-              <a:rPr lang="en-US" sz="1600" dirty="0" smtClean="0"/>
+              <a:rPr lang="en-US" sz="1600" dirty="0"/>
               <a:t>) + </a:t>
             </a:r>
             <a:r>
-              <a:rPr lang="en-US" sz="1600" dirty="0" err="1" smtClean="0"/>
+              <a:rPr lang="en-US" sz="1600" dirty="0" err="1"/>
               <a:t>geom_smooth</a:t>
             </a:r>
             <a:r>
-              <a:rPr lang="en-US" sz="1600" dirty="0" smtClean="0"/>
+              <a:rPr lang="en-US" sz="1600" dirty="0"/>
               <a:t>(method = “lm”)</a:t>
             </a:r>
-            <a:endParaRPr lang="en-US" sz="1600" dirty="0"/>
           </a:p>
         </p:txBody>
       </p:sp>
@@ -6551,84 +6354,6 @@
   <p:clrMapOvr>
     <a:masterClrMapping/>
   </p:clrMapOvr>
-  <p:timing>
-    <p:tnLst>
-      <p:par>
-        <p:cTn id="1" dur="indefinite" restart="never" nodeType="tmRoot">
-          <p:childTnLst>
-            <p:seq concurrent="1" nextAc="seek">
-              <p:cTn id="2" dur="indefinite" nodeType="mainSeq">
-                <p:childTnLst>
-                  <p:par>
-                    <p:cTn id="3" fill="hold">
-                      <p:stCondLst>
-                        <p:cond delay="indefinite"/>
-                      </p:stCondLst>
-                      <p:childTnLst>
-                        <p:par>
-                          <p:cTn id="4" fill="hold">
-                            <p:stCondLst>
-                              <p:cond delay="0"/>
-                            </p:stCondLst>
-                            <p:childTnLst>
-                              <p:par>
-                                <p:cTn id="5" presetID="1" presetClass="entr" presetSubtype="0" fill="hold" grpId="0" nodeType="clickEffect">
-                                  <p:stCondLst>
-                                    <p:cond delay="0"/>
-                                  </p:stCondLst>
-                                  <p:childTnLst>
-                                    <p:set>
-                                      <p:cBhvr>
-                                        <p:cTn id="6" dur="1" fill="hold">
-                                          <p:stCondLst>
-                                            <p:cond delay="0"/>
-                                          </p:stCondLst>
-                                        </p:cTn>
-                                        <p:tgtEl>
-                                          <p:spTgt spid="5"/>
-                                        </p:tgtEl>
-                                        <p:attrNameLst>
-                                          <p:attrName>style.visibility</p:attrName>
-                                        </p:attrNameLst>
-                                      </p:cBhvr>
-                                      <p:to>
-                                        <p:strVal val="visible"/>
-                                      </p:to>
-                                    </p:set>
-                                  </p:childTnLst>
-                                </p:cTn>
-                              </p:par>
-                            </p:childTnLst>
-                          </p:cTn>
-                        </p:par>
-                      </p:childTnLst>
-                    </p:cTn>
-                  </p:par>
-                </p:childTnLst>
-              </p:cTn>
-              <p:prevCondLst>
-                <p:cond evt="onPrev" delay="0">
-                  <p:tgtEl>
-                    <p:sldTgt/>
-                  </p:tgtEl>
-                </p:cond>
-              </p:prevCondLst>
-              <p:nextCondLst>
-                <p:cond evt="onNext" delay="0">
-                  <p:tgtEl>
-                    <p:sldTgt/>
-                  </p:tgtEl>
-                </p:cond>
-              </p:nextCondLst>
-            </p:seq>
-          </p:childTnLst>
-        </p:cTn>
-      </p:par>
-    </p:tnLst>
-    <p:bldLst>
-      <p:bldP spid="5" grpId="0" animBg="1"/>
-    </p:bldLst>
-  </p:timing>
 </p:sld>
 </file>
 
@@ -6800,13 +6525,6 @@
   <p:clrMapOvr>
     <a:masterClrMapping/>
   </p:clrMapOvr>
-  <p:timing>
-    <p:tnLst>
-      <p:par>
-        <p:cTn id="1" dur="indefinite" restart="never" nodeType="tmRoot"/>
-      </p:par>
-    </p:tnLst>
-  </p:timing>
 </p:sld>
 </file>
 
@@ -6881,28 +6599,16 @@
           </a:p>
           <a:p>
             <a:r>
-              <a:rPr lang="en-US" dirty="0" smtClean="0"/>
-              <a:t>Produces </a:t>
-            </a:r>
-            <a:r>
               <a:rPr lang="en-US" dirty="0"/>
-              <a:t>very nice </a:t>
-            </a:r>
-            <a:r>
-              <a:rPr lang="en-US" dirty="0" smtClean="0"/>
-              <a:t>graphics </a:t>
-            </a:r>
-            <a:r>
-              <a:rPr lang="en-US" i="1" dirty="0" smtClean="0"/>
+              <a:t>Produces very nice graphics </a:t>
+            </a:r>
+            <a:r>
+              <a:rPr lang="en-US" i="1" dirty="0"/>
               <a:t>quickly</a:t>
             </a:r>
             <a:r>
-              <a:rPr lang="en-US" dirty="0" smtClean="0"/>
-              <a:t>, </a:t>
-            </a:r>
-            <a:r>
               <a:rPr lang="en-US" dirty="0"/>
-              <a:t>essentially publication ready (if you like the design)</a:t>
+              <a:t>, essentially publication ready (if you like the design)</a:t>
             </a:r>
           </a:p>
           <a:p>
@@ -6923,13 +6629,6 @@
   <p:clrMapOvr>
     <a:masterClrMapping/>
   </p:clrMapOvr>
-  <p:timing>
-    <p:tnLst>
-      <p:par>
-        <p:cTn id="1" dur="indefinite" restart="never" nodeType="tmRoot"/>
-      </p:par>
-    </p:tnLst>
-  </p:timing>
 </p:sld>
 </file>
 
@@ -6984,65 +6683,67 @@
         </p:nvSpPr>
         <p:spPr/>
         <p:txBody>
-          <a:bodyPr/>
-          <a:lstStyle/>
-          <a:p>
-            <a:r>
-              <a:rPr lang="en-US"/>
+          <a:bodyPr>
+            <a:normAutofit fontScale="92500"/>
+          </a:bodyPr>
+          <a:lstStyle/>
+          <a:p>
+            <a:r>
+              <a:rPr lang="en-US" dirty="0"/>
               <a:t>The </a:t>
             </a:r>
             <a:r>
-              <a:rPr lang="en-US" i="1"/>
+              <a:rPr lang="en-US" i="1" dirty="0"/>
               <a:t>ggplot2</a:t>
             </a:r>
             <a:r>
-              <a:rPr lang="en-US"/>
+              <a:rPr lang="en-US" dirty="0"/>
               <a:t> book by Hadley Wickham</a:t>
             </a:r>
           </a:p>
           <a:p>
             <a:r>
-              <a:rPr lang="en-US"/>
+              <a:rPr lang="en-US" dirty="0"/>
               <a:t>The </a:t>
             </a:r>
             <a:r>
-              <a:rPr lang="en-US" i="1"/>
+              <a:rPr lang="en-US" i="1" dirty="0"/>
               <a:t>R Graphics Cookbook</a:t>
             </a:r>
             <a:r>
-              <a:rPr lang="en-US"/>
+              <a:rPr lang="en-US" dirty="0"/>
               <a:t> by Winston Chang (examples in base plots and in ggplot2)</a:t>
             </a:r>
           </a:p>
           <a:p>
             <a:r>
-              <a:rPr lang="en-US"/>
+              <a:rPr lang="en-US" dirty="0"/>
               <a:t>ggplot2 web site (</a:t>
             </a:r>
             <a:r>
-              <a:rPr lang="en-US">
+              <a:rPr lang="en-US" dirty="0">
                 <a:hlinkClick r:id="rId2"/>
               </a:rPr>
-              <a:t>http://ggplot2.org</a:t>
-            </a:r>
-            <a:r>
-              <a:rPr lang="en-US"/>
+              <a:t>https://ggplot2.tidyverse.org</a:t>
+            </a:r>
+            <a:r>
+              <a:rPr lang="en-US" dirty="0"/>
               <a:t>)</a:t>
             </a:r>
           </a:p>
           <a:p>
             <a:r>
-              <a:rPr lang="en-US"/>
+              <a:rPr lang="en-US" dirty="0"/>
               <a:t>ggplot2 mailing list (</a:t>
             </a:r>
             <a:r>
-              <a:rPr lang="en-US">
+              <a:rPr lang="en-US" dirty="0">
                 <a:hlinkClick r:id="rId3"/>
               </a:rPr>
               <a:t>http://goo.gl/OdW3uB</a:t>
             </a:r>
             <a:r>
-              <a:rPr lang="en-US"/>
+              <a:rPr lang="en-US" dirty="0"/>
               <a:t>), primarily for developers</a:t>
             </a:r>
           </a:p>
@@ -7058,13 +6759,6 @@
   <p:clrMapOvr>
     <a:masterClrMapping/>
   </p:clrMapOvr>
-  <p:timing>
-    <p:tnLst>
-      <p:par>
-        <p:cTn id="1" dur="indefinite" restart="never" nodeType="tmRoot"/>
-      </p:par>
-    </p:tnLst>
-  </p:timing>
 </p:sld>
 </file>
 
@@ -7223,20 +6917,16 @@
               <a:buNone/>
             </a:pPr>
             <a:r>
-              <a:rPr lang="en-US" dirty="0" smtClean="0"/>
+              <a:rPr lang="en-US" dirty="0"/>
               <a:t>“</a:t>
             </a:r>
             <a:r>
-              <a:rPr lang="is-IS" dirty="0" smtClean="0"/>
+              <a:rPr lang="is-IS" dirty="0"/>
               <a:t>…</a:t>
             </a:r>
             <a:r>
-              <a:rPr lang="en-US" dirty="0" smtClean="0"/>
-              <a:t>the </a:t>
-            </a:r>
-            <a:r>
               <a:rPr lang="en-US" dirty="0"/>
-              <a:t>grammar tells us that a statistical graphic is a </a:t>
+              <a:t>the grammar tells us that a statistical graphic is a </a:t>
             </a:r>
             <a:r>
               <a:rPr lang="en-US" b="1" dirty="0"/>
@@ -7756,41 +7446,8 @@
           <a:p>
             <a:r>
               <a:rPr lang="en-US" dirty="0"/>
-              <a:t>Use of panel functions </a:t>
-            </a:r>
-            <a:r>
-              <a:rPr lang="en-US" dirty="0" smtClean="0"/>
-              <a:t>to annotate plots was </a:t>
-            </a:r>
-            <a:r>
-              <a:rPr lang="en-US" dirty="0" smtClean="0"/>
-              <a:t>difficult </a:t>
-            </a:r>
-            <a:r>
-              <a:rPr lang="en-US" dirty="0" smtClean="0"/>
-              <a:t>to </a:t>
-            </a:r>
-            <a:r>
-              <a:rPr lang="en-US" dirty="0" smtClean="0"/>
-              <a:t>wield </a:t>
-            </a:r>
-            <a:r>
-              <a:rPr lang="en-US" dirty="0"/>
-              <a:t>and </a:t>
-            </a:r>
-            <a:r>
-              <a:rPr lang="en-US" dirty="0" smtClean="0"/>
-              <a:t>required </a:t>
-            </a:r>
-            <a:r>
-              <a:rPr lang="en-US" dirty="0"/>
-              <a:t>intense </a:t>
-            </a:r>
-            <a:r>
-              <a:rPr lang="en-US" dirty="0" smtClean="0"/>
-              <a:t>preparation</a:t>
-            </a:r>
-            <a:endParaRPr lang="en-US" dirty="0"/>
+              <a:t>Use of panel functions to annotate plots was difficult to wield and required intense preparation</a:t>
+            </a:r>
           </a:p>
         </p:txBody>
       </p:sp>
@@ -7896,13 +7553,8 @@
           <a:p>
             <a:r>
               <a:rPr lang="en-US" dirty="0"/>
-              <a:t>Default mode makes many choices for </a:t>
-            </a:r>
-            <a:r>
-              <a:rPr lang="en-US" dirty="0" smtClean="0"/>
-              <a:t>you (but you can customize)</a:t>
-            </a:r>
-            <a:endParaRPr lang="en-US" dirty="0"/>
+              <a:t>Default mode makes many choices for you (but you can customize)</a:t>
+            </a:r>
           </a:p>
         </p:txBody>
       </p:sp>

</xml_diff>